<commit_message>
Apply content length guidelines to GitHub solution briefings
Updated both GitHub solution-briefing.md files per content requirements:
- Success Story: Client <10 words, Challenge <40 words, Solution <20 words, Results <40 words, Testimonial <50 words
- Solution Overview: Each of 2 main items has max 3 sub-items, each sub-item <13 words
- Implementation Approach: Each phase has max 3 sub-items (already compliant)
- Investment Summary: Manually populated cost tables with calculated values from infrastructure-costs.csv

Changes made:
- Advanced Security Client: Reduced from 14 to 9 words
- Advanced Security Solution: Reduced from 31 to 13 words
- Actions Client: Reduced from 14 to 9 words
- Actions Solution: Reduced from 40 to 13 words
- Actions Results: Reduced from 46 to 26 words
- All Solution Overview sub-items reduced to <13 words
- Populated Investment Summary tables with detailed cost breakdowns

Regenerated all Office documents with updated content.
</commit_message>
<xml_diff>
--- a/solutions/github/cyber-security/advanced-security/presales/solution-briefing.pptx
+++ b/solutions/github/cyber-security/advanced-security/presales/solution-briefing.pptx
@@ -693,6 +693,39 @@
       </p:grpSpPr>
       <p:sp>
         <p:nvSpPr>
+          <p:cNvPr id="12" name="Picture Placeholder 13">
+            <a:extLst>
+              <a:ext uri="{FF2B5EF4-FFF2-40B4-BE49-F238E27FC236}">
+                <a16:creationId xmlns:a16="http://schemas.microsoft.com/office/drawing/2014/main" id="{2DB97592-C4D5-B315-7F11-AA14F6EE8A62}"/>
+              </a:ext>
+            </a:extLst>
+          </p:cNvPr>
+          <p:cNvSpPr>
+            <a:spLocks noGrp="1"/>
+          </p:cNvSpPr>
+          <p:nvPr>
+            <p:ph type="pic" sz="quarter" idx="13"/>
+          </p:nvPr>
+        </p:nvSpPr>
+        <p:spPr>
+          <a:xfrm>
+            <a:off x="313593" y="4536078"/>
+            <a:ext cx="2143858" cy="529698"/>
+          </a:xfrm>
+          <a:prstGeom prst="rect">
+            <a:avLst/>
+          </a:prstGeom>
+        </p:spPr>
+        <p:txBody>
+          <a:bodyPr/>
+          <a:lstStyle/>
+          <a:p>
+            <a:endParaRPr lang="en-US" dirty="0"/>
+          </a:p>
+        </p:txBody>
+      </p:sp>
+      <p:sp>
+        <p:nvSpPr>
           <p:cNvPr id="3" name="Shape 1">
             <a:extLst>
               <a:ext uri="{FF2B5EF4-FFF2-40B4-BE49-F238E27FC236}">
@@ -782,39 +815,6 @@
               <a:rPr lang="en-US" dirty="0"/>
               <a:t>Slide Title</a:t>
             </a:r>
-          </a:p>
-        </p:txBody>
-      </p:sp>
-      <p:sp>
-        <p:nvSpPr>
-          <p:cNvPr id="12" name="Picture Placeholder 13">
-            <a:extLst>
-              <a:ext uri="{FF2B5EF4-FFF2-40B4-BE49-F238E27FC236}">
-                <a16:creationId xmlns:a16="http://schemas.microsoft.com/office/drawing/2014/main" id="{2DB97592-C4D5-B315-7F11-AA14F6EE8A62}"/>
-              </a:ext>
-            </a:extLst>
-          </p:cNvPr>
-          <p:cNvSpPr>
-            <a:spLocks noGrp="1"/>
-          </p:cNvSpPr>
-          <p:nvPr>
-            <p:ph type="pic" sz="quarter" idx="13"/>
-          </p:nvPr>
-        </p:nvSpPr>
-        <p:spPr>
-          <a:xfrm>
-            <a:off x="313593" y="4536078"/>
-            <a:ext cx="2143858" cy="529698"/>
-          </a:xfrm>
-          <a:prstGeom prst="rect">
-            <a:avLst/>
-          </a:prstGeom>
-        </p:spPr>
-        <p:txBody>
-          <a:bodyPr/>
-          <a:lstStyle/>
-          <a:p>
-            <a:endParaRPr lang="en-US" dirty="0"/>
           </a:p>
         </p:txBody>
       </p:sp>
@@ -971,6 +971,39 @@
       </p:grpSpPr>
       <p:sp>
         <p:nvSpPr>
+          <p:cNvPr id="12" name="Picture Placeholder 13">
+            <a:extLst>
+              <a:ext uri="{FF2B5EF4-FFF2-40B4-BE49-F238E27FC236}">
+                <a16:creationId xmlns:a16="http://schemas.microsoft.com/office/drawing/2014/main" id="{2DB97592-C4D5-B315-7F11-AA14F6EE8A62}"/>
+              </a:ext>
+            </a:extLst>
+          </p:cNvPr>
+          <p:cNvSpPr>
+            <a:spLocks noGrp="1"/>
+          </p:cNvSpPr>
+          <p:nvPr>
+            <p:ph type="pic" sz="quarter" idx="13"/>
+          </p:nvPr>
+        </p:nvSpPr>
+        <p:spPr>
+          <a:xfrm>
+            <a:off x="313593" y="4536078"/>
+            <a:ext cx="2143858" cy="529698"/>
+          </a:xfrm>
+          <a:prstGeom prst="rect">
+            <a:avLst/>
+          </a:prstGeom>
+        </p:spPr>
+        <p:txBody>
+          <a:bodyPr/>
+          <a:lstStyle/>
+          <a:p>
+            <a:endParaRPr lang="en-US" dirty="0"/>
+          </a:p>
+        </p:txBody>
+      </p:sp>
+      <p:sp>
+        <p:nvSpPr>
           <p:cNvPr id="3" name="Shape 1">
             <a:extLst>
               <a:ext uri="{FF2B5EF4-FFF2-40B4-BE49-F238E27FC236}">
@@ -1060,39 +1093,6 @@
               <a:rPr lang="en-US" dirty="0"/>
               <a:t>Bullet Points</a:t>
             </a:r>
-          </a:p>
-        </p:txBody>
-      </p:sp>
-      <p:sp>
-        <p:nvSpPr>
-          <p:cNvPr id="12" name="Picture Placeholder 13">
-            <a:extLst>
-              <a:ext uri="{FF2B5EF4-FFF2-40B4-BE49-F238E27FC236}">
-                <a16:creationId xmlns:a16="http://schemas.microsoft.com/office/drawing/2014/main" id="{2DB97592-C4D5-B315-7F11-AA14F6EE8A62}"/>
-              </a:ext>
-            </a:extLst>
-          </p:cNvPr>
-          <p:cNvSpPr>
-            <a:spLocks noGrp="1"/>
-          </p:cNvSpPr>
-          <p:nvPr>
-            <p:ph type="pic" sz="quarter" idx="13"/>
-          </p:nvPr>
-        </p:nvSpPr>
-        <p:spPr>
-          <a:xfrm>
-            <a:off x="313593" y="4536078"/>
-            <a:ext cx="2143858" cy="529698"/>
-          </a:xfrm>
-          <a:prstGeom prst="rect">
-            <a:avLst/>
-          </a:prstGeom>
-        </p:spPr>
-        <p:txBody>
-          <a:bodyPr/>
-          <a:lstStyle/>
-          <a:p>
-            <a:endParaRPr lang="en-US" dirty="0"/>
           </a:p>
         </p:txBody>
       </p:sp>
@@ -1235,6 +1235,39 @@
       </p:grpSpPr>
       <p:sp>
         <p:nvSpPr>
+          <p:cNvPr id="10" name="Picture Placeholder 13">
+            <a:extLst>
+              <a:ext uri="{FF2B5EF4-FFF2-40B4-BE49-F238E27FC236}">
+                <a16:creationId xmlns:a16="http://schemas.microsoft.com/office/drawing/2014/main" id="{6A0FA445-7602-F06E-EC73-5504EBF827CC}"/>
+              </a:ext>
+            </a:extLst>
+          </p:cNvPr>
+          <p:cNvSpPr>
+            <a:spLocks noGrp="1"/>
+          </p:cNvSpPr>
+          <p:nvPr>
+            <p:ph type="pic" sz="quarter" idx="14"/>
+          </p:nvPr>
+        </p:nvSpPr>
+        <p:spPr>
+          <a:xfrm>
+            <a:off x="313592" y="4536078"/>
+            <a:ext cx="2121877" cy="529698"/>
+          </a:xfrm>
+          <a:prstGeom prst="rect">
+            <a:avLst/>
+          </a:prstGeom>
+        </p:spPr>
+        <p:txBody>
+          <a:bodyPr/>
+          <a:lstStyle/>
+          <a:p>
+            <a:endParaRPr lang="en-US" dirty="0"/>
+          </a:p>
+        </p:txBody>
+      </p:sp>
+      <p:sp>
+        <p:nvSpPr>
           <p:cNvPr id="3" name="Shape 1">
             <a:extLst>
               <a:ext uri="{FF2B5EF4-FFF2-40B4-BE49-F238E27FC236}">
@@ -1324,39 +1357,6 @@
               <a:rPr lang="en-US" dirty="0"/>
               <a:t>Two Column Layout</a:t>
             </a:r>
-          </a:p>
-        </p:txBody>
-      </p:sp>
-      <p:sp>
-        <p:nvSpPr>
-          <p:cNvPr id="10" name="Picture Placeholder 13">
-            <a:extLst>
-              <a:ext uri="{FF2B5EF4-FFF2-40B4-BE49-F238E27FC236}">
-                <a16:creationId xmlns:a16="http://schemas.microsoft.com/office/drawing/2014/main" id="{6A0FA445-7602-F06E-EC73-5504EBF827CC}"/>
-              </a:ext>
-            </a:extLst>
-          </p:cNvPr>
-          <p:cNvSpPr>
-            <a:spLocks noGrp="1"/>
-          </p:cNvSpPr>
-          <p:nvPr>
-            <p:ph type="pic" sz="quarter" idx="14"/>
-          </p:nvPr>
-        </p:nvSpPr>
-        <p:spPr>
-          <a:xfrm>
-            <a:off x="313592" y="4536078"/>
-            <a:ext cx="2121877" cy="529698"/>
-          </a:xfrm>
-          <a:prstGeom prst="rect">
-            <a:avLst/>
-          </a:prstGeom>
-        </p:spPr>
-        <p:txBody>
-          <a:bodyPr/>
-          <a:lstStyle/>
-          <a:p>
-            <a:endParaRPr lang="en-US" dirty="0"/>
           </a:p>
         </p:txBody>
       </p:sp>
@@ -1604,6 +1604,39 @@
       </p:grpSpPr>
       <p:sp>
         <p:nvSpPr>
+          <p:cNvPr id="12" name="Picture Placeholder 13">
+            <a:extLst>
+              <a:ext uri="{FF2B5EF4-FFF2-40B4-BE49-F238E27FC236}">
+                <a16:creationId xmlns:a16="http://schemas.microsoft.com/office/drawing/2014/main" id="{2DB97592-C4D5-B315-7F11-AA14F6EE8A62}"/>
+              </a:ext>
+            </a:extLst>
+          </p:cNvPr>
+          <p:cNvSpPr>
+            <a:spLocks noGrp="1"/>
+          </p:cNvSpPr>
+          <p:nvPr>
+            <p:ph type="pic" sz="quarter" idx="13"/>
+          </p:nvPr>
+        </p:nvSpPr>
+        <p:spPr>
+          <a:xfrm>
+            <a:off x="313592" y="4536078"/>
+            <a:ext cx="2126273" cy="529698"/>
+          </a:xfrm>
+          <a:prstGeom prst="rect">
+            <a:avLst/>
+          </a:prstGeom>
+        </p:spPr>
+        <p:txBody>
+          <a:bodyPr/>
+          <a:lstStyle/>
+          <a:p>
+            <a:endParaRPr lang="en-US" dirty="0"/>
+          </a:p>
+        </p:txBody>
+      </p:sp>
+      <p:sp>
+        <p:nvSpPr>
           <p:cNvPr id="3" name="Shape 1">
             <a:extLst>
               <a:ext uri="{FF2B5EF4-FFF2-40B4-BE49-F238E27FC236}">
@@ -1719,39 +1752,6 @@
           </a:p>
           <a:p>
             <a:pPr lvl="0"/>
-            <a:endParaRPr lang="en-US" dirty="0"/>
-          </a:p>
-        </p:txBody>
-      </p:sp>
-      <p:sp>
-        <p:nvSpPr>
-          <p:cNvPr id="12" name="Picture Placeholder 13">
-            <a:extLst>
-              <a:ext uri="{FF2B5EF4-FFF2-40B4-BE49-F238E27FC236}">
-                <a16:creationId xmlns:a16="http://schemas.microsoft.com/office/drawing/2014/main" id="{2DB97592-C4D5-B315-7F11-AA14F6EE8A62}"/>
-              </a:ext>
-            </a:extLst>
-          </p:cNvPr>
-          <p:cNvSpPr>
-            <a:spLocks noGrp="1"/>
-          </p:cNvSpPr>
-          <p:nvPr>
-            <p:ph type="pic" sz="quarter" idx="13"/>
-          </p:nvPr>
-        </p:nvSpPr>
-        <p:spPr>
-          <a:xfrm>
-            <a:off x="313592" y="4536078"/>
-            <a:ext cx="2126273" cy="529698"/>
-          </a:xfrm>
-          <a:prstGeom prst="rect">
-            <a:avLst/>
-          </a:prstGeom>
-        </p:spPr>
-        <p:txBody>
-          <a:bodyPr/>
-          <a:lstStyle/>
-          <a:p>
             <a:endParaRPr lang="en-US" dirty="0"/>
           </a:p>
         </p:txBody>
@@ -1863,6 +1863,39 @@
       </p:grpSpPr>
       <p:sp>
         <p:nvSpPr>
+          <p:cNvPr id="10" name="Picture Placeholder 13">
+            <a:extLst>
+              <a:ext uri="{FF2B5EF4-FFF2-40B4-BE49-F238E27FC236}">
+                <a16:creationId xmlns:a16="http://schemas.microsoft.com/office/drawing/2014/main" id="{6A0FA445-7602-F06E-EC73-5504EBF827CC}"/>
+              </a:ext>
+            </a:extLst>
+          </p:cNvPr>
+          <p:cNvSpPr>
+            <a:spLocks noGrp="1"/>
+          </p:cNvSpPr>
+          <p:nvPr>
+            <p:ph type="pic" sz="quarter" idx="14"/>
+          </p:nvPr>
+        </p:nvSpPr>
+        <p:spPr>
+          <a:xfrm>
+            <a:off x="313592" y="4536078"/>
+            <a:ext cx="2130670" cy="529698"/>
+          </a:xfrm>
+          <a:prstGeom prst="rect">
+            <a:avLst/>
+          </a:prstGeom>
+        </p:spPr>
+        <p:txBody>
+          <a:bodyPr/>
+          <a:lstStyle/>
+          <a:p>
+            <a:endParaRPr lang="en-US" dirty="0"/>
+          </a:p>
+        </p:txBody>
+      </p:sp>
+      <p:sp>
+        <p:nvSpPr>
           <p:cNvPr id="3" name="Shape 1">
             <a:extLst>
               <a:ext uri="{FF2B5EF4-FFF2-40B4-BE49-F238E27FC236}">
@@ -1952,39 +1985,6 @@
               <a:rPr lang="en-US" dirty="0"/>
               <a:t>Visual Content</a:t>
             </a:r>
-          </a:p>
-        </p:txBody>
-      </p:sp>
-      <p:sp>
-        <p:nvSpPr>
-          <p:cNvPr id="10" name="Picture Placeholder 13">
-            <a:extLst>
-              <a:ext uri="{FF2B5EF4-FFF2-40B4-BE49-F238E27FC236}">
-                <a16:creationId xmlns:a16="http://schemas.microsoft.com/office/drawing/2014/main" id="{6A0FA445-7602-F06E-EC73-5504EBF827CC}"/>
-              </a:ext>
-            </a:extLst>
-          </p:cNvPr>
-          <p:cNvSpPr>
-            <a:spLocks noGrp="1"/>
-          </p:cNvSpPr>
-          <p:nvPr>
-            <p:ph type="pic" sz="quarter" idx="14"/>
-          </p:nvPr>
-        </p:nvSpPr>
-        <p:spPr>
-          <a:xfrm>
-            <a:off x="313592" y="4536078"/>
-            <a:ext cx="2130670" cy="529698"/>
-          </a:xfrm>
-          <a:prstGeom prst="rect">
-            <a:avLst/>
-          </a:prstGeom>
-        </p:spPr>
-        <p:txBody>
-          <a:bodyPr/>
-          <a:lstStyle/>
-          <a:p>
-            <a:endParaRPr lang="en-US" dirty="0"/>
           </a:p>
         </p:txBody>
       </p:sp>
@@ -2180,6 +2180,39 @@
       </p:grpSpPr>
       <p:sp>
         <p:nvSpPr>
+          <p:cNvPr id="10" name="Picture Placeholder 13">
+            <a:extLst>
+              <a:ext uri="{FF2B5EF4-FFF2-40B4-BE49-F238E27FC236}">
+                <a16:creationId xmlns:a16="http://schemas.microsoft.com/office/drawing/2014/main" id="{6A0FA445-7602-F06E-EC73-5504EBF827CC}"/>
+              </a:ext>
+            </a:extLst>
+          </p:cNvPr>
+          <p:cNvSpPr>
+            <a:spLocks noGrp="1"/>
+          </p:cNvSpPr>
+          <p:nvPr>
+            <p:ph type="pic" sz="quarter" idx="14"/>
+          </p:nvPr>
+        </p:nvSpPr>
+        <p:spPr>
+          <a:xfrm>
+            <a:off x="313592" y="4536078"/>
+            <a:ext cx="2104294" cy="529698"/>
+          </a:xfrm>
+          <a:prstGeom prst="rect">
+            <a:avLst/>
+          </a:prstGeom>
+        </p:spPr>
+        <p:txBody>
+          <a:bodyPr/>
+          <a:lstStyle/>
+          <a:p>
+            <a:endParaRPr lang="en-US" dirty="0"/>
+          </a:p>
+        </p:txBody>
+      </p:sp>
+      <p:sp>
+        <p:nvSpPr>
           <p:cNvPr id="3" name="Shape 1">
             <a:extLst>
               <a:ext uri="{FF2B5EF4-FFF2-40B4-BE49-F238E27FC236}">
@@ -2269,39 +2302,6 @@
               <a:rPr lang="en-US" dirty="0"/>
               <a:t>Data Visualization</a:t>
             </a:r>
-          </a:p>
-        </p:txBody>
-      </p:sp>
-      <p:sp>
-        <p:nvSpPr>
-          <p:cNvPr id="10" name="Picture Placeholder 13">
-            <a:extLst>
-              <a:ext uri="{FF2B5EF4-FFF2-40B4-BE49-F238E27FC236}">
-                <a16:creationId xmlns:a16="http://schemas.microsoft.com/office/drawing/2014/main" id="{6A0FA445-7602-F06E-EC73-5504EBF827CC}"/>
-              </a:ext>
-            </a:extLst>
-          </p:cNvPr>
-          <p:cNvSpPr>
-            <a:spLocks noGrp="1"/>
-          </p:cNvSpPr>
-          <p:nvPr>
-            <p:ph type="pic" sz="quarter" idx="14"/>
-          </p:nvPr>
-        </p:nvSpPr>
-        <p:spPr>
-          <a:xfrm>
-            <a:off x="313592" y="4536078"/>
-            <a:ext cx="2104294" cy="529698"/>
-          </a:xfrm>
-          <a:prstGeom prst="rect">
-            <a:avLst/>
-          </a:prstGeom>
-        </p:spPr>
-        <p:txBody>
-          <a:bodyPr/>
-          <a:lstStyle/>
-          <a:p>
-            <a:endParaRPr lang="en-US" dirty="0"/>
           </a:p>
         </p:txBody>
       </p:sp>
@@ -3375,7 +3375,19 @@
       <p:grpSpPr/>
       <p:sp>
         <p:nvSpPr>
-          <p:cNvPr id="2" name="Text Placeholder 1"/>
+          <p:cNvPr id="2" name="Picture Placeholder 1"/>
+          <p:cNvSpPr>
+            <a:spLocks noGrp="1"/>
+          </p:cNvSpPr>
+          <p:nvPr>
+            <p:ph type="pic" idx="13" sz="quarter"/>
+          </p:nvPr>
+        </p:nvSpPr>
+        <p:spPr/>
+      </p:sp>
+      <p:sp>
+        <p:nvSpPr>
+          <p:cNvPr id="3" name="Text Placeholder 2"/>
           <p:cNvSpPr>
             <a:spLocks noGrp="1"/>
           </p:cNvSpPr>
@@ -3394,18 +3406,6 @@
             </a:r>
           </a:p>
         </p:txBody>
-      </p:sp>
-      <p:sp>
-        <p:nvSpPr>
-          <p:cNvPr id="3" name="Picture Placeholder 2"/>
-          <p:cNvSpPr>
-            <a:spLocks noGrp="1"/>
-          </p:cNvSpPr>
-          <p:nvPr>
-            <p:ph type="pic" idx="13" sz="quarter"/>
-          </p:nvPr>
-        </p:nvSpPr>
-        <p:spPr/>
       </p:sp>
       <p:sp>
         <p:nvSpPr>
@@ -3619,7 +3619,19 @@
       <p:grpSpPr/>
       <p:sp>
         <p:nvSpPr>
-          <p:cNvPr id="2" name="Text Placeholder 1"/>
+          <p:cNvPr id="2" name="Picture Placeholder 1"/>
+          <p:cNvSpPr>
+            <a:spLocks noGrp="1"/>
+          </p:cNvSpPr>
+          <p:nvPr>
+            <p:ph type="pic" idx="14" sz="quarter"/>
+          </p:nvPr>
+        </p:nvSpPr>
+        <p:spPr/>
+      </p:sp>
+      <p:sp>
+        <p:nvSpPr>
+          <p:cNvPr id="3" name="Text Placeholder 2"/>
           <p:cNvSpPr>
             <a:spLocks noGrp="1"/>
           </p:cNvSpPr>
@@ -3638,18 +3650,6 @@
             </a:r>
           </a:p>
         </p:txBody>
-      </p:sp>
-      <p:sp>
-        <p:nvSpPr>
-          <p:cNvPr id="3" name="Picture Placeholder 2"/>
-          <p:cNvSpPr>
-            <a:spLocks noGrp="1"/>
-          </p:cNvSpPr>
-          <p:nvPr>
-            <p:ph type="pic" idx="14" sz="quarter"/>
-          </p:nvPr>
-        </p:nvSpPr>
-        <p:spPr/>
       </p:sp>
       <p:sp>
         <p:nvSpPr>
@@ -3782,7 +3782,19 @@
       <p:grpSpPr/>
       <p:sp>
         <p:nvSpPr>
-          <p:cNvPr id="2" name="Text Placeholder 1"/>
+          <p:cNvPr id="2" name="Picture Placeholder 1"/>
+          <p:cNvSpPr>
+            <a:spLocks noGrp="1"/>
+          </p:cNvSpPr>
+          <p:nvPr>
+            <p:ph type="pic" idx="13" sz="quarter"/>
+          </p:nvPr>
+        </p:nvSpPr>
+        <p:spPr/>
+      </p:sp>
+      <p:sp>
+        <p:nvSpPr>
+          <p:cNvPr id="3" name="Text Placeholder 2"/>
           <p:cNvSpPr>
             <a:spLocks noGrp="1"/>
           </p:cNvSpPr>
@@ -3801,18 +3813,6 @@
             </a:r>
           </a:p>
         </p:txBody>
-      </p:sp>
-      <p:sp>
-        <p:nvSpPr>
-          <p:cNvPr id="3" name="Picture Placeholder 2"/>
-          <p:cNvSpPr>
-            <a:spLocks noGrp="1"/>
-          </p:cNvSpPr>
-          <p:nvPr>
-            <p:ph type="pic" idx="13" sz="quarter"/>
-          </p:nvPr>
-        </p:nvSpPr>
-        <p:spPr/>
       </p:sp>
       <p:graphicFrame>
         <p:nvGraphicFramePr>
@@ -4566,7 +4566,19 @@
       <p:grpSpPr/>
       <p:sp>
         <p:nvSpPr>
-          <p:cNvPr id="2" name="Text Placeholder 1"/>
+          <p:cNvPr id="2" name="Picture Placeholder 1"/>
+          <p:cNvSpPr>
+            <a:spLocks noGrp="1"/>
+          </p:cNvSpPr>
+          <p:nvPr>
+            <p:ph type="pic" idx="14" sz="quarter"/>
+          </p:nvPr>
+        </p:nvSpPr>
+        <p:spPr/>
+      </p:sp>
+      <p:sp>
+        <p:nvSpPr>
+          <p:cNvPr id="3" name="Text Placeholder 2"/>
           <p:cNvSpPr>
             <a:spLocks noGrp="1"/>
           </p:cNvSpPr>
@@ -4585,18 +4597,6 @@
             </a:r>
           </a:p>
         </p:txBody>
-      </p:sp>
-      <p:sp>
-        <p:nvSpPr>
-          <p:cNvPr id="3" name="Picture Placeholder 2"/>
-          <p:cNvSpPr>
-            <a:spLocks noGrp="1"/>
-          </p:cNvSpPr>
-          <p:nvPr>
-            <p:ph type="pic" idx="14" sz="quarter"/>
-          </p:nvPr>
-        </p:nvSpPr>
-        <p:spPr/>
       </p:sp>
       <p:sp>
         <p:nvSpPr>
@@ -4622,19 +4622,19 @@
           <a:p>
             <a:pPr lvl="1"/>
             <a:r>
-              <a:t>CodeQL semantic analysis engine detecting 300+ CWE vulnerability patterns</a:t>
+              <a:t>CodeQL analysis detecting 300+ CWE vulnerability patterns</a:t>
             </a:r>
           </a:p>
           <a:p>
             <a:pPr lvl="1"/>
             <a:r>
-              <a:t>SQL injection XSS CSRF authentication bypass path traversal detection</a:t>
+              <a:t>SQL injection XSS CSRF authentication bypass path traversal</a:t>
             </a:r>
           </a:p>
           <a:p>
             <a:pPr lvl="1"/>
             <a:r>
-              <a:t>Custom queries for company-specific security policies and framework patterns</a:t>
+              <a:t>Custom queries for company-specific security policies</a:t>
             </a:r>
           </a:p>
           <a:p>
@@ -4647,7 +4647,7 @@
           <a:p>
             <a:pPr lvl="1"/>
             <a:r>
-              <a:t>Secret scanning for API keys passwords tokens with push protection</a:t>
+              <a:t>Secret scanning for API keys passwords with push protection</a:t>
             </a:r>
           </a:p>
           <a:p>
@@ -4743,7 +4743,19 @@
       <p:grpSpPr/>
       <p:sp>
         <p:nvSpPr>
-          <p:cNvPr id="2" name="Text Placeholder 1"/>
+          <p:cNvPr id="2" name="Picture Placeholder 1"/>
+          <p:cNvSpPr>
+            <a:spLocks noGrp="1"/>
+          </p:cNvSpPr>
+          <p:nvPr>
+            <p:ph type="pic" idx="13" sz="quarter"/>
+          </p:nvPr>
+        </p:nvSpPr>
+        <p:spPr/>
+      </p:sp>
+      <p:sp>
+        <p:nvSpPr>
+          <p:cNvPr id="3" name="Text Placeholder 2"/>
           <p:cNvSpPr>
             <a:spLocks noGrp="1"/>
           </p:cNvSpPr>
@@ -4762,18 +4774,6 @@
             </a:r>
           </a:p>
         </p:txBody>
-      </p:sp>
-      <p:sp>
-        <p:nvSpPr>
-          <p:cNvPr id="3" name="Picture Placeholder 2"/>
-          <p:cNvSpPr>
-            <a:spLocks noGrp="1"/>
-          </p:cNvSpPr>
-          <p:nvPr>
-            <p:ph type="pic" idx="13" sz="quarter"/>
-          </p:nvPr>
-        </p:nvSpPr>
-        <p:spPr/>
       </p:sp>
       <p:sp>
         <p:nvSpPr>
@@ -4915,7 +4915,19 @@
       <p:grpSpPr/>
       <p:sp>
         <p:nvSpPr>
-          <p:cNvPr id="2" name="Text Placeholder 1"/>
+          <p:cNvPr id="2" name="Picture Placeholder 1"/>
+          <p:cNvSpPr>
+            <a:spLocks noGrp="1"/>
+          </p:cNvSpPr>
+          <p:nvPr>
+            <p:ph type="pic" idx="13" sz="quarter"/>
+          </p:nvPr>
+        </p:nvSpPr>
+        <p:spPr/>
+      </p:sp>
+      <p:sp>
+        <p:nvSpPr>
+          <p:cNvPr id="3" name="Text Placeholder 2"/>
           <p:cNvSpPr>
             <a:spLocks noGrp="1"/>
           </p:cNvSpPr>
@@ -4934,18 +4946,6 @@
             </a:r>
           </a:p>
         </p:txBody>
-      </p:sp>
-      <p:sp>
-        <p:nvSpPr>
-          <p:cNvPr id="3" name="Picture Placeholder 2"/>
-          <p:cNvSpPr>
-            <a:spLocks noGrp="1"/>
-          </p:cNvSpPr>
-          <p:nvPr>
-            <p:ph type="pic" idx="13" sz="quarter"/>
-          </p:nvPr>
-        </p:nvSpPr>
-        <p:spPr/>
       </p:sp>
       <p:graphicFrame>
         <p:nvGraphicFramePr>
@@ -5322,7 +5322,19 @@
       <p:grpSpPr/>
       <p:sp>
         <p:nvSpPr>
-          <p:cNvPr id="2" name="Text Placeholder 1"/>
+          <p:cNvPr id="2" name="Picture Placeholder 1"/>
+          <p:cNvSpPr>
+            <a:spLocks noGrp="1"/>
+          </p:cNvSpPr>
+          <p:nvPr>
+            <p:ph type="pic" idx="13" sz="quarter"/>
+          </p:nvPr>
+        </p:nvSpPr>
+        <p:spPr/>
+      </p:sp>
+      <p:sp>
+        <p:nvSpPr>
+          <p:cNvPr id="3" name="Text Placeholder 2"/>
           <p:cNvSpPr>
             <a:spLocks noGrp="1"/>
           </p:cNvSpPr>
@@ -5341,18 +5353,6 @@
             </a:r>
           </a:p>
         </p:txBody>
-      </p:sp>
-      <p:sp>
-        <p:nvSpPr>
-          <p:cNvPr id="3" name="Picture Placeholder 2"/>
-          <p:cNvSpPr>
-            <a:spLocks noGrp="1"/>
-          </p:cNvSpPr>
-          <p:nvPr>
-            <p:ph type="pic" idx="13" sz="quarter"/>
-          </p:nvPr>
-        </p:nvSpPr>
-        <p:spPr/>
       </p:sp>
       <p:sp>
         <p:nvSpPr>
@@ -5382,7 +5382,7 @@
               <a:t>Client:</a:t>
             </a:r>
             <a:r>
-              <a:t> Global fintech processing 2 billion transactions annually with 300 developers across 500+ repositories</a:t>
+              <a:t> Global fintech with 300 developers across 500+ repositories</a:t>
             </a:r>
           </a:p>
           <a:p>
@@ -5402,7 +5402,7 @@
               <a:t>Solution:</a:t>
             </a:r>
             <a:r>
-              <a:t> Deployed GitHub Advanced Security with CodeQL for automated SAST scanning, secret scanning with push protection, and Dependabot for SCA. Developed 20 custom CodeQL queries for financial regulatory patterns.</a:t>
+              <a:t> Deployed GitHub Advanced Security with CodeQL SAST, secret scanning with push protection, and Dependabot SCA.</a:t>
             </a:r>
           </a:p>
           <a:p>
@@ -5483,7 +5483,19 @@
       <p:grpSpPr/>
       <p:sp>
         <p:nvSpPr>
-          <p:cNvPr id="2" name="Text Placeholder 1"/>
+          <p:cNvPr id="2" name="Picture Placeholder 1"/>
+          <p:cNvSpPr>
+            <a:spLocks noGrp="1"/>
+          </p:cNvSpPr>
+          <p:nvPr>
+            <p:ph type="pic" idx="14" sz="quarter"/>
+          </p:nvPr>
+        </p:nvSpPr>
+        <p:spPr/>
+      </p:sp>
+      <p:sp>
+        <p:nvSpPr>
+          <p:cNvPr id="3" name="Text Placeholder 2"/>
           <p:cNvSpPr>
             <a:spLocks noGrp="1"/>
           </p:cNvSpPr>
@@ -5502,18 +5514,6 @@
             </a:r>
           </a:p>
         </p:txBody>
-      </p:sp>
-      <p:sp>
-        <p:nvSpPr>
-          <p:cNvPr id="3" name="Picture Placeholder 2"/>
-          <p:cNvSpPr>
-            <a:spLocks noGrp="1"/>
-          </p:cNvSpPr>
-          <p:nvPr>
-            <p:ph type="pic" idx="14" sz="quarter"/>
-          </p:nvPr>
-        </p:nvSpPr>
-        <p:spPr/>
       </p:sp>
       <p:sp>
         <p:nvSpPr>
@@ -5658,7 +5658,19 @@
       <p:grpSpPr/>
       <p:sp>
         <p:nvSpPr>
-          <p:cNvPr id="2" name="Text Placeholder 1"/>
+          <p:cNvPr id="2" name="Picture Placeholder 1"/>
+          <p:cNvSpPr>
+            <a:spLocks noGrp="1"/>
+          </p:cNvSpPr>
+          <p:nvPr>
+            <p:ph type="pic" idx="13" sz="quarter"/>
+          </p:nvPr>
+        </p:nvSpPr>
+        <p:spPr/>
+      </p:sp>
+      <p:sp>
+        <p:nvSpPr>
+          <p:cNvPr id="3" name="Text Placeholder 2"/>
           <p:cNvSpPr>
             <a:spLocks noGrp="1"/>
           </p:cNvSpPr>
@@ -5677,18 +5689,6 @@
             </a:r>
           </a:p>
         </p:txBody>
-      </p:sp>
-      <p:sp>
-        <p:nvSpPr>
-          <p:cNvPr id="3" name="Picture Placeholder 2"/>
-          <p:cNvSpPr>
-            <a:spLocks noGrp="1"/>
-          </p:cNvSpPr>
-          <p:nvPr>
-            <p:ph type="pic" idx="13" sz="quarter"/>
-          </p:nvPr>
-        </p:nvSpPr>
-        <p:spPr/>
       </p:sp>
       <p:graphicFrame>
         <p:nvGraphicFramePr>

</xml_diff>